<commit_message>
Adicionado ficheiro de ajuda à apresentação. Preenchida a tabela de comparação.
</commit_message>
<xml_diff>
--- a/CI_TEAMC_barbosa.pptx
+++ b/CI_TEAMC_barbosa.pptx
@@ -249,7 +249,7 @@
           <a:p>
             <a:fld id="{20EA5F0D-C1DC-412F-A146-DDB3A74B588F}" type="datetimeFigureOut">
               <a:rPr lang="en-US"/>
-              <a:t>10/3/2016</a:t>
+              <a:t>10/4/2016</a:t>
             </a:fld>
             <a:endParaRPr/>
           </a:p>
@@ -414,7 +414,7 @@
           <a:p>
             <a:fld id="{A8CDE508-72C8-4AB5-AA9C-1584D31690E0}" type="datetimeFigureOut">
               <a:rPr lang="en-US"/>
-              <a:t>10/3/2016</a:t>
+              <a:t>10/4/2016</a:t>
             </a:fld>
             <a:endParaRPr/>
           </a:p>
@@ -16510,11 +16510,7 @@
           <a:p>
             <a:r>
               <a:rPr lang="en-GB" dirty="0" smtClean="0"/>
-              <a:t>License cost:$800-$</a:t>
-            </a:r>
-            <a:r>
-              <a:rPr lang="en-GB" dirty="0" smtClean="0"/>
-              <a:t>80K</a:t>
+              <a:t>License cost:$800-$80K</a:t>
             </a:r>
             <a:endParaRPr lang="en-GB" dirty="0"/>
           </a:p>
@@ -17545,7 +17541,7 @@
           <p:nvPr>
             <p:extLst>
               <p:ext uri="{D42A27DB-BD31-4B8C-83A1-F6EECF244321}">
-                <p14:modId xmlns:p14="http://schemas.microsoft.com/office/powerpoint/2010/main" val="3531305546"/>
+                <p14:modId xmlns:p14="http://schemas.microsoft.com/office/powerpoint/2010/main" val="3406213519"/>
               </p:ext>
             </p:extLst>
           </p:nvPr>
@@ -17782,7 +17778,11 @@
                     <a:bodyPr/>
                     <a:lstStyle/>
                     <a:p>
-                      <a:endParaRPr lang="pt-PT"/>
+                      <a:r>
+                        <a:rPr lang="pt-PT" dirty="0" smtClean="0"/>
+                        <a:t>YES</a:t>
+                      </a:r>
+                      <a:endParaRPr lang="pt-PT" dirty="0"/>
                     </a:p>
                   </a:txBody>
                   <a:tcPr/>
@@ -17842,6 +17842,10 @@
                     <a:bodyPr/>
                     <a:lstStyle/>
                     <a:p>
+                      <a:r>
+                        <a:rPr lang="pt-PT" dirty="0" smtClean="0"/>
+                        <a:t>YES</a:t>
+                      </a:r>
                       <a:endParaRPr lang="pt-PT" dirty="0"/>
                     </a:p>
                   </a:txBody>
@@ -17898,7 +17902,11 @@
                     <a:bodyPr/>
                     <a:lstStyle/>
                     <a:p>
-                      <a:endParaRPr lang="pt-PT"/>
+                      <a:r>
+                        <a:rPr lang="pt-PT" dirty="0" smtClean="0"/>
+                        <a:t>YES</a:t>
+                      </a:r>
+                      <a:endParaRPr lang="pt-PT" dirty="0"/>
                     </a:p>
                   </a:txBody>
                   <a:tcPr/>
@@ -17958,7 +17966,11 @@
                     <a:bodyPr/>
                     <a:lstStyle/>
                     <a:p>
-                      <a:endParaRPr lang="pt-PT"/>
+                      <a:r>
+                        <a:rPr lang="pt-PT" dirty="0" smtClean="0"/>
+                        <a:t>NO</a:t>
+                      </a:r>
+                      <a:endParaRPr lang="pt-PT" dirty="0"/>
                     </a:p>
                   </a:txBody>
                   <a:tcPr/>
@@ -18014,6 +18026,10 @@
                     <a:bodyPr/>
                     <a:lstStyle/>
                     <a:p>
+                      <a:r>
+                        <a:rPr lang="pt-PT" dirty="0" smtClean="0"/>
+                        <a:t>YES</a:t>
+                      </a:r>
                       <a:endParaRPr lang="pt-PT" dirty="0"/>
                     </a:p>
                   </a:txBody>
@@ -18245,6 +18261,24 @@
             <a:endParaRPr lang="en-US" dirty="0" smtClean="0"/>
           </a:p>
           <a:p>
+            <a:r>
+              <a:rPr lang="en-US" dirty="0">
+                <a:hlinkClick r:id="rId3"/>
+              </a:rPr>
+              <a:t>https://</a:t>
+            </a:r>
+            <a:r>
+              <a:rPr lang="en-US" dirty="0" smtClean="0">
+                <a:hlinkClick r:id="rId3"/>
+              </a:rPr>
+              <a:t>www.atlassian.com/software/bamboo</a:t>
+            </a:r>
+            <a:endParaRPr lang="en-US" dirty="0" smtClean="0"/>
+          </a:p>
+          <a:p>
+            <a:endParaRPr lang="en-US" dirty="0" smtClean="0"/>
+          </a:p>
+          <a:p>
             <a:endParaRPr lang="en-US" dirty="0"/>
           </a:p>
         </p:txBody>
@@ -18327,7 +18361,7 @@
           <p:nvPr/>
         </p:nvPicPr>
         <p:blipFill>
-          <a:blip r:embed="rId3" cstate="print">
+          <a:blip r:embed="rId4" cstate="print">
             <a:extLst>
               <a:ext uri="{28A0092B-C50C-407E-A947-70E740481C1C}">
                 <a14:useLocalDpi xmlns:a14="http://schemas.microsoft.com/office/drawing/2010/main" val="0"/>
@@ -20028,7 +20062,7 @@
         </p:blipFill>
         <p:spPr>
           <a:xfrm>
-            <a:off x="10201767" y="3501008"/>
+            <a:off x="10194975" y="3351729"/>
             <a:ext cx="449171" cy="449171"/>
           </a:xfrm>
           <a:prstGeom prst="rect">
@@ -20076,7 +20110,7 @@
         </p:blipFill>
         <p:spPr>
           <a:xfrm rot="10295589">
-            <a:off x="10201766" y="4824817"/>
+            <a:off x="10221206" y="4718877"/>
             <a:ext cx="449171" cy="449171"/>
           </a:xfrm>
           <a:prstGeom prst="rect">
@@ -20148,7 +20182,7 @@
         </p:blipFill>
         <p:spPr>
           <a:xfrm>
-            <a:off x="10216017" y="4232749"/>
+            <a:off x="10207925" y="4058889"/>
             <a:ext cx="449171" cy="449171"/>
           </a:xfrm>
           <a:prstGeom prst="rect">
@@ -20976,8 +21010,8 @@
         </p:nvSpPr>
         <p:spPr>
           <a:xfrm>
-            <a:off x="588894" y="2483153"/>
-            <a:ext cx="11080427" cy="1200329"/>
+            <a:off x="555786" y="2764333"/>
+            <a:ext cx="11080427" cy="646331"/>
           </a:xfrm>
           <a:prstGeom prst="rect">
             <a:avLst/>
@@ -20996,17 +21030,11 @@
             </a:pPr>
             <a:r>
               <a:rPr lang="en-GB" dirty="0" smtClean="0"/>
-              <a:t>Like most of the others CI’s, developers commits trigger build processes. Which passes though 4 phases (compilation, unit testing, integration testing, activating the new version).</a:t>
-            </a:r>
-          </a:p>
-          <a:p>
-            <a:pPr marL="285750" indent="-285750">
-              <a:buFont typeface="Arial" panose="020B0604020202020204" pitchFamily="34" charset="0"/>
-              <a:buChar char="•"/>
-            </a:pPr>
+              <a:t>Bamboo </a:t>
+            </a:r>
             <a:r>
               <a:rPr lang="en-GB" dirty="0" smtClean="0"/>
-              <a:t>Bamboo uses the concept of a ‘plan’ with ‘jobs’ and ‘tasks’ to configure and order actions in the workflow.</a:t>
+              <a:t>uses the concept of a ‘plan’ with ‘jobs’ and ‘tasks’ to configure and order actions in the workflow.</a:t>
             </a:r>
             <a:endParaRPr lang="en-GB" dirty="0"/>
           </a:p>

</xml_diff>